<commit_message>
edit file : guide.pptx
</commit_message>
<xml_diff>
--- a/web/자료/guide.pptx
+++ b/web/자료/guide.pptx
@@ -279,7 +279,7 @@
           <a:p>
             <a:fld id="{276A4E87-46C1-4A36-B4E8-BFF5C124B506}" type="datetimeFigureOut">
               <a:rPr lang="ko-KR" altLang="en-US" smtClean="0"/>
-              <a:t>2018-07-27</a:t>
+              <a:t>2018-07-30</a:t>
             </a:fld>
             <a:endParaRPr lang="ko-KR" altLang="en-US"/>
           </a:p>
@@ -449,7 +449,7 @@
           <a:p>
             <a:fld id="{276A4E87-46C1-4A36-B4E8-BFF5C124B506}" type="datetimeFigureOut">
               <a:rPr lang="ko-KR" altLang="en-US" smtClean="0"/>
-              <a:t>2018-07-27</a:t>
+              <a:t>2018-07-30</a:t>
             </a:fld>
             <a:endParaRPr lang="ko-KR" altLang="en-US"/>
           </a:p>
@@ -629,7 +629,7 @@
           <a:p>
             <a:fld id="{276A4E87-46C1-4A36-B4E8-BFF5C124B506}" type="datetimeFigureOut">
               <a:rPr lang="ko-KR" altLang="en-US" smtClean="0"/>
-              <a:t>2018-07-27</a:t>
+              <a:t>2018-07-30</a:t>
             </a:fld>
             <a:endParaRPr lang="ko-KR" altLang="en-US"/>
           </a:p>
@@ -799,7 +799,7 @@
           <a:p>
             <a:fld id="{276A4E87-46C1-4A36-B4E8-BFF5C124B506}" type="datetimeFigureOut">
               <a:rPr lang="ko-KR" altLang="en-US" smtClean="0"/>
-              <a:t>2018-07-27</a:t>
+              <a:t>2018-07-30</a:t>
             </a:fld>
             <a:endParaRPr lang="ko-KR" altLang="en-US"/>
           </a:p>
@@ -1045,7 +1045,7 @@
           <a:p>
             <a:fld id="{276A4E87-46C1-4A36-B4E8-BFF5C124B506}" type="datetimeFigureOut">
               <a:rPr lang="ko-KR" altLang="en-US" smtClean="0"/>
-              <a:t>2018-07-27</a:t>
+              <a:t>2018-07-30</a:t>
             </a:fld>
             <a:endParaRPr lang="ko-KR" altLang="en-US"/>
           </a:p>
@@ -1277,7 +1277,7 @@
           <a:p>
             <a:fld id="{276A4E87-46C1-4A36-B4E8-BFF5C124B506}" type="datetimeFigureOut">
               <a:rPr lang="ko-KR" altLang="en-US" smtClean="0"/>
-              <a:t>2018-07-27</a:t>
+              <a:t>2018-07-30</a:t>
             </a:fld>
             <a:endParaRPr lang="ko-KR" altLang="en-US"/>
           </a:p>
@@ -1644,7 +1644,7 @@
           <a:p>
             <a:fld id="{276A4E87-46C1-4A36-B4E8-BFF5C124B506}" type="datetimeFigureOut">
               <a:rPr lang="ko-KR" altLang="en-US" smtClean="0"/>
-              <a:t>2018-07-27</a:t>
+              <a:t>2018-07-30</a:t>
             </a:fld>
             <a:endParaRPr lang="ko-KR" altLang="en-US"/>
           </a:p>
@@ -1762,7 +1762,7 @@
           <a:p>
             <a:fld id="{276A4E87-46C1-4A36-B4E8-BFF5C124B506}" type="datetimeFigureOut">
               <a:rPr lang="ko-KR" altLang="en-US" smtClean="0"/>
-              <a:t>2018-07-27</a:t>
+              <a:t>2018-07-30</a:t>
             </a:fld>
             <a:endParaRPr lang="ko-KR" altLang="en-US"/>
           </a:p>
@@ -1857,7 +1857,7 @@
           <a:p>
             <a:fld id="{276A4E87-46C1-4A36-B4E8-BFF5C124B506}" type="datetimeFigureOut">
               <a:rPr lang="ko-KR" altLang="en-US" smtClean="0"/>
-              <a:t>2018-07-27</a:t>
+              <a:t>2018-07-30</a:t>
             </a:fld>
             <a:endParaRPr lang="ko-KR" altLang="en-US"/>
           </a:p>
@@ -2134,7 +2134,7 @@
           <a:p>
             <a:fld id="{276A4E87-46C1-4A36-B4E8-BFF5C124B506}" type="datetimeFigureOut">
               <a:rPr lang="ko-KR" altLang="en-US" smtClean="0"/>
-              <a:t>2018-07-27</a:t>
+              <a:t>2018-07-30</a:t>
             </a:fld>
             <a:endParaRPr lang="ko-KR" altLang="en-US"/>
           </a:p>
@@ -2387,7 +2387,7 @@
           <a:p>
             <a:fld id="{276A4E87-46C1-4A36-B4E8-BFF5C124B506}" type="datetimeFigureOut">
               <a:rPr lang="ko-KR" altLang="en-US" smtClean="0"/>
-              <a:t>2018-07-27</a:t>
+              <a:t>2018-07-30</a:t>
             </a:fld>
             <a:endParaRPr lang="ko-KR" altLang="en-US"/>
           </a:p>
@@ -2600,7 +2600,7 @@
           <a:p>
             <a:fld id="{276A4E87-46C1-4A36-B4E8-BFF5C124B506}" type="datetimeFigureOut">
               <a:rPr lang="ko-KR" altLang="en-US" smtClean="0"/>
-              <a:t>2018-07-27</a:t>
+              <a:t>2018-07-30</a:t>
             </a:fld>
             <a:endParaRPr lang="ko-KR" altLang="en-US"/>
           </a:p>
@@ -4561,11 +4561,7 @@
           <a:p>
             <a:r>
               <a:rPr lang="en-US" altLang="ko-KR" sz="1600" dirty="0" smtClean="0"/>
-              <a:t>Basic </a:t>
-            </a:r>
-            <a:r>
-              <a:rPr lang="en-US" altLang="ko-KR" sz="1600" dirty="0" smtClean="0"/>
-              <a:t>component - paging</a:t>
+              <a:t>Basic component - paging</a:t>
             </a:r>
             <a:endParaRPr lang="ko-KR" altLang="en-US" sz="1600" dirty="0"/>
           </a:p>
@@ -5579,7 +5575,7 @@
           <a:graphicData uri="http://schemas.openxmlformats.org/presentationml/2006/ole">
             <mc:AlternateContent xmlns:mc="http://schemas.openxmlformats.org/markup-compatibility/2006">
               <mc:Choice xmlns:v="urn:schemas-microsoft-com:vml" Requires="v">
-                <p:oleObj spid="_x0000_s6168" name="Image" r:id="rId3" imgW="2450520" imgH="495000" progId="Photoshop.Image.18">
+                <p:oleObj spid="_x0000_s6170" name="Image" r:id="rId3" imgW="2450520" imgH="495000" progId="Photoshop.Image.18">
                   <p:embed/>
                 </p:oleObj>
               </mc:Choice>
@@ -6566,11 +6562,7 @@
           <a:p>
             <a:r>
               <a:rPr lang="en-US" altLang="ko-KR" sz="1600" dirty="0" smtClean="0"/>
-              <a:t>Basic </a:t>
-            </a:r>
-            <a:r>
-              <a:rPr lang="en-US" altLang="ko-KR" sz="1600" dirty="0" smtClean="0"/>
-              <a:t>component – dropdown menu</a:t>
+              <a:t>Basic component – dropdown menu</a:t>
             </a:r>
             <a:endParaRPr lang="ko-KR" altLang="en-US" sz="1600" dirty="0"/>
           </a:p>
@@ -7384,7 +7376,7 @@
           <a:graphicData uri="http://schemas.openxmlformats.org/presentationml/2006/ole">
             <mc:AlternateContent xmlns:mc="http://schemas.openxmlformats.org/markup-compatibility/2006">
               <mc:Choice xmlns:v="urn:schemas-microsoft-com:vml" Requires="v">
-                <p:oleObj spid="_x0000_s10246" name="Image" r:id="rId3" imgW="2399760" imgH="1929960" progId="Photoshop.Image.18">
+                <p:oleObj spid="_x0000_s10248" name="Image" r:id="rId3" imgW="2399760" imgH="1929960" progId="Photoshop.Image.18">
                   <p:embed/>
                 </p:oleObj>
               </mc:Choice>
@@ -7568,24 +7560,367 @@
           <a:p>
             <a:r>
               <a:rPr lang="en-US" altLang="ko-KR" sz="1600" dirty="0" smtClean="0"/>
-              <a:t>Basic </a:t>
-            </a:r>
-            <a:r>
-              <a:rPr lang="en-US" altLang="ko-KR" sz="1600" dirty="0" smtClean="0"/>
-              <a:t>component – grid system</a:t>
+              <a:t>Basic component – grid system</a:t>
             </a:r>
           </a:p>
         </p:txBody>
       </p:sp>
       <p:sp>
         <p:nvSpPr>
-          <p:cNvPr id="4" name="직사각형 3"/>
+          <p:cNvPr id="14" name="직사각형 13"/>
           <p:cNvSpPr/>
           <p:nvPr/>
         </p:nvSpPr>
         <p:spPr>
           <a:xfrm>
-            <a:off x="224444" y="667512"/>
+            <a:off x="239684" y="1073898"/>
+            <a:ext cx="3551582" cy="769441"/>
+          </a:xfrm>
+          <a:prstGeom prst="rect">
+            <a:avLst/>
+          </a:prstGeom>
+        </p:spPr>
+        <p:txBody>
+          <a:bodyPr wrap="square">
+            <a:spAutoFit/>
+          </a:bodyPr>
+          <a:lstStyle>
+            <a:defPPr>
+              <a:defRPr lang="ko-KR"/>
+            </a:defPPr>
+            <a:lvl1pPr marL="0" algn="l" defTabSz="914400" rtl="0" eaLnBrk="1" latinLnBrk="1" hangingPunct="1">
+              <a:defRPr sz="1800" kern="1200">
+                <a:solidFill>
+                  <a:schemeClr val="tx1"/>
+                </a:solidFill>
+                <a:latin typeface="+mn-lt"/>
+                <a:ea typeface="+mn-ea"/>
+                <a:cs typeface="+mn-cs"/>
+              </a:defRPr>
+            </a:lvl1pPr>
+            <a:lvl2pPr marL="457200" algn="l" defTabSz="914400" rtl="0" eaLnBrk="1" latinLnBrk="1" hangingPunct="1">
+              <a:defRPr sz="1800" kern="1200">
+                <a:solidFill>
+                  <a:schemeClr val="tx1"/>
+                </a:solidFill>
+                <a:latin typeface="+mn-lt"/>
+                <a:ea typeface="+mn-ea"/>
+                <a:cs typeface="+mn-cs"/>
+              </a:defRPr>
+            </a:lvl2pPr>
+            <a:lvl3pPr marL="914400" algn="l" defTabSz="914400" rtl="0" eaLnBrk="1" latinLnBrk="1" hangingPunct="1">
+              <a:defRPr sz="1800" kern="1200">
+                <a:solidFill>
+                  <a:schemeClr val="tx1"/>
+                </a:solidFill>
+                <a:latin typeface="+mn-lt"/>
+                <a:ea typeface="+mn-ea"/>
+                <a:cs typeface="+mn-cs"/>
+              </a:defRPr>
+            </a:lvl3pPr>
+            <a:lvl4pPr marL="1371600" algn="l" defTabSz="914400" rtl="0" eaLnBrk="1" latinLnBrk="1" hangingPunct="1">
+              <a:defRPr sz="1800" kern="1200">
+                <a:solidFill>
+                  <a:schemeClr val="tx1"/>
+                </a:solidFill>
+                <a:latin typeface="+mn-lt"/>
+                <a:ea typeface="+mn-ea"/>
+                <a:cs typeface="+mn-cs"/>
+              </a:defRPr>
+            </a:lvl4pPr>
+            <a:lvl5pPr marL="1828800" algn="l" defTabSz="914400" rtl="0" eaLnBrk="1" latinLnBrk="1" hangingPunct="1">
+              <a:defRPr sz="1800" kern="1200">
+                <a:solidFill>
+                  <a:schemeClr val="tx1"/>
+                </a:solidFill>
+                <a:latin typeface="+mn-lt"/>
+                <a:ea typeface="+mn-ea"/>
+                <a:cs typeface="+mn-cs"/>
+              </a:defRPr>
+            </a:lvl5pPr>
+            <a:lvl6pPr marL="2286000" algn="l" defTabSz="914400" rtl="0" eaLnBrk="1" latinLnBrk="1" hangingPunct="1">
+              <a:defRPr sz="1800" kern="1200">
+                <a:solidFill>
+                  <a:schemeClr val="tx1"/>
+                </a:solidFill>
+                <a:latin typeface="+mn-lt"/>
+                <a:ea typeface="+mn-ea"/>
+                <a:cs typeface="+mn-cs"/>
+              </a:defRPr>
+            </a:lvl6pPr>
+            <a:lvl7pPr marL="2743200" algn="l" defTabSz="914400" rtl="0" eaLnBrk="1" latinLnBrk="1" hangingPunct="1">
+              <a:defRPr sz="1800" kern="1200">
+                <a:solidFill>
+                  <a:schemeClr val="tx1"/>
+                </a:solidFill>
+                <a:latin typeface="+mn-lt"/>
+                <a:ea typeface="+mn-ea"/>
+                <a:cs typeface="+mn-cs"/>
+              </a:defRPr>
+            </a:lvl7pPr>
+            <a:lvl8pPr marL="3200400" algn="l" defTabSz="914400" rtl="0" eaLnBrk="1" latinLnBrk="1" hangingPunct="1">
+              <a:defRPr sz="1800" kern="1200">
+                <a:solidFill>
+                  <a:schemeClr val="tx1"/>
+                </a:solidFill>
+                <a:latin typeface="+mn-lt"/>
+                <a:ea typeface="+mn-ea"/>
+                <a:cs typeface="+mn-cs"/>
+              </a:defRPr>
+            </a:lvl8pPr>
+            <a:lvl9pPr marL="3657600" algn="l" defTabSz="914400" rtl="0" eaLnBrk="1" latinLnBrk="1" hangingPunct="1">
+              <a:defRPr sz="1800" kern="1200">
+                <a:solidFill>
+                  <a:schemeClr val="tx1"/>
+                </a:solidFill>
+                <a:latin typeface="+mn-lt"/>
+                <a:ea typeface="+mn-ea"/>
+                <a:cs typeface="+mn-cs"/>
+              </a:defRPr>
+            </a:lvl9pPr>
+          </a:lstStyle>
+          <a:p>
+            <a:r>
+              <a:rPr lang="en-US" altLang="ko-KR" sz="1100" dirty="0">
+                <a:solidFill>
+                  <a:srgbClr val="0000CD"/>
+                </a:solidFill>
+                <a:latin typeface="Consolas" panose="020B0609020204030204" pitchFamily="49" charset="0"/>
+              </a:rPr>
+              <a:t>&lt;</a:t>
+            </a:r>
+            <a:r>
+              <a:rPr lang="en-US" altLang="ko-KR" sz="1100" dirty="0">
+                <a:solidFill>
+                  <a:srgbClr val="A52A2A"/>
+                </a:solidFill>
+                <a:latin typeface="Consolas" panose="020B0609020204030204" pitchFamily="49" charset="0"/>
+              </a:rPr>
+              <a:t>div</a:t>
+            </a:r>
+            <a:r>
+              <a:rPr lang="en-US" altLang="ko-KR" sz="1100" dirty="0">
+                <a:solidFill>
+                  <a:srgbClr val="FF0000"/>
+                </a:solidFill>
+                <a:latin typeface="Consolas" panose="020B0609020204030204" pitchFamily="49" charset="0"/>
+              </a:rPr>
+              <a:t> class</a:t>
+            </a:r>
+            <a:r>
+              <a:rPr lang="en-US" altLang="ko-KR" sz="1100" dirty="0" smtClean="0">
+                <a:solidFill>
+                  <a:srgbClr val="0000CD"/>
+                </a:solidFill>
+                <a:latin typeface="Consolas" panose="020B0609020204030204" pitchFamily="49" charset="0"/>
+              </a:rPr>
+              <a:t>=“row”&gt;</a:t>
+            </a:r>
+            <a:r>
+              <a:rPr lang="en-US" altLang="ko-KR" sz="1100" dirty="0"/>
+              <a:t/>
+            </a:r>
+            <a:br>
+              <a:rPr lang="en-US" altLang="ko-KR" sz="1100" dirty="0"/>
+            </a:br>
+            <a:r>
+              <a:rPr lang="en-US" altLang="ko-KR" sz="1100" dirty="0">
+                <a:solidFill>
+                  <a:srgbClr val="000000"/>
+                </a:solidFill>
+                <a:latin typeface="Consolas" panose="020B0609020204030204" pitchFamily="49" charset="0"/>
+              </a:rPr>
+              <a:t>  </a:t>
+            </a:r>
+            <a:r>
+              <a:rPr lang="en-US" altLang="ko-KR" sz="1100" dirty="0">
+                <a:solidFill>
+                  <a:srgbClr val="0000CD"/>
+                </a:solidFill>
+                <a:latin typeface="Consolas" panose="020B0609020204030204" pitchFamily="49" charset="0"/>
+              </a:rPr>
+              <a:t>&lt;</a:t>
+            </a:r>
+            <a:r>
+              <a:rPr lang="en-US" altLang="ko-KR" sz="1100" dirty="0">
+                <a:solidFill>
+                  <a:srgbClr val="A52A2A"/>
+                </a:solidFill>
+                <a:latin typeface="Consolas" panose="020B0609020204030204" pitchFamily="49" charset="0"/>
+              </a:rPr>
+              <a:t>div</a:t>
+            </a:r>
+            <a:r>
+              <a:rPr lang="en-US" altLang="ko-KR" sz="1100" dirty="0">
+                <a:solidFill>
+                  <a:srgbClr val="FF0000"/>
+                </a:solidFill>
+                <a:latin typeface="Consolas" panose="020B0609020204030204" pitchFamily="49" charset="0"/>
+              </a:rPr>
+              <a:t> class</a:t>
+            </a:r>
+            <a:r>
+              <a:rPr lang="en-US" altLang="ko-KR" sz="1100" dirty="0" smtClean="0">
+                <a:solidFill>
+                  <a:srgbClr val="0000CD"/>
+                </a:solidFill>
+                <a:latin typeface="Consolas" panose="020B0609020204030204" pitchFamily="49" charset="0"/>
+              </a:rPr>
+              <a:t>=“col-*-*”&gt;&lt;</a:t>
+            </a:r>
+            <a:r>
+              <a:rPr lang="en-US" altLang="ko-KR" sz="1100" dirty="0" smtClean="0">
+                <a:solidFill>
+                  <a:srgbClr val="A52A2A"/>
+                </a:solidFill>
+                <a:latin typeface="Consolas" panose="020B0609020204030204" pitchFamily="49" charset="0"/>
+              </a:rPr>
+              <a:t>/</a:t>
+            </a:r>
+            <a:r>
+              <a:rPr lang="en-US" altLang="ko-KR" sz="1100" dirty="0">
+                <a:solidFill>
+                  <a:srgbClr val="A52A2A"/>
+                </a:solidFill>
+                <a:latin typeface="Consolas" panose="020B0609020204030204" pitchFamily="49" charset="0"/>
+              </a:rPr>
+              <a:t>div</a:t>
+            </a:r>
+            <a:r>
+              <a:rPr lang="en-US" altLang="ko-KR" sz="1100" dirty="0">
+                <a:solidFill>
+                  <a:srgbClr val="0000CD"/>
+                </a:solidFill>
+                <a:latin typeface="Consolas" panose="020B0609020204030204" pitchFamily="49" charset="0"/>
+              </a:rPr>
+              <a:t>&gt;</a:t>
+            </a:r>
+            <a:r>
+              <a:rPr lang="en-US" altLang="ko-KR" sz="1100" dirty="0"/>
+              <a:t/>
+            </a:r>
+            <a:br>
+              <a:rPr lang="en-US" altLang="ko-KR" sz="1100" dirty="0"/>
+            </a:br>
+            <a:r>
+              <a:rPr lang="en-US" altLang="ko-KR" sz="1100" dirty="0">
+                <a:solidFill>
+                  <a:srgbClr val="000000"/>
+                </a:solidFill>
+                <a:latin typeface="Consolas" panose="020B0609020204030204" pitchFamily="49" charset="0"/>
+              </a:rPr>
+              <a:t>  </a:t>
+            </a:r>
+            <a:r>
+              <a:rPr lang="en-US" altLang="ko-KR" sz="1100" dirty="0">
+                <a:solidFill>
+                  <a:srgbClr val="0000CD"/>
+                </a:solidFill>
+                <a:latin typeface="Consolas" panose="020B0609020204030204" pitchFamily="49" charset="0"/>
+              </a:rPr>
+              <a:t>&lt;</a:t>
+            </a:r>
+            <a:r>
+              <a:rPr lang="en-US" altLang="ko-KR" sz="1100" dirty="0">
+                <a:solidFill>
+                  <a:srgbClr val="A52A2A"/>
+                </a:solidFill>
+                <a:latin typeface="Consolas" panose="020B0609020204030204" pitchFamily="49" charset="0"/>
+              </a:rPr>
+              <a:t>div</a:t>
+            </a:r>
+            <a:r>
+              <a:rPr lang="en-US" altLang="ko-KR" sz="1100" dirty="0">
+                <a:solidFill>
+                  <a:srgbClr val="FF0000"/>
+                </a:solidFill>
+                <a:latin typeface="Consolas" panose="020B0609020204030204" pitchFamily="49" charset="0"/>
+              </a:rPr>
+              <a:t> class</a:t>
+            </a:r>
+            <a:r>
+              <a:rPr lang="en-US" altLang="ko-KR" sz="1100" dirty="0" smtClean="0">
+                <a:solidFill>
+                  <a:srgbClr val="0000CD"/>
+                </a:solidFill>
+                <a:latin typeface="Consolas" panose="020B0609020204030204" pitchFamily="49" charset="0"/>
+              </a:rPr>
+              <a:t>=“col-</a:t>
+            </a:r>
+            <a:r>
+              <a:rPr lang="en-US" altLang="ko-KR" sz="1100" dirty="0">
+                <a:solidFill>
+                  <a:srgbClr val="0000CD"/>
+                </a:solidFill>
+                <a:latin typeface="Consolas" panose="020B0609020204030204" pitchFamily="49" charset="0"/>
+              </a:rPr>
+              <a:t>*-*"&gt;&lt;</a:t>
+            </a:r>
+            <a:r>
+              <a:rPr lang="en-US" altLang="ko-KR" sz="1100" dirty="0">
+                <a:solidFill>
+                  <a:srgbClr val="A52A2A"/>
+                </a:solidFill>
+                <a:latin typeface="Consolas" panose="020B0609020204030204" pitchFamily="49" charset="0"/>
+              </a:rPr>
+              <a:t>/div</a:t>
+            </a:r>
+            <a:r>
+              <a:rPr lang="en-US" altLang="ko-KR" sz="1100" dirty="0">
+                <a:solidFill>
+                  <a:srgbClr val="0000CD"/>
+                </a:solidFill>
+                <a:latin typeface="Consolas" panose="020B0609020204030204" pitchFamily="49" charset="0"/>
+              </a:rPr>
+              <a:t>&gt;</a:t>
+            </a:r>
+            <a:r>
+              <a:rPr lang="en-US" altLang="ko-KR" sz="1100" dirty="0"/>
+              <a:t/>
+            </a:r>
+            <a:br>
+              <a:rPr lang="en-US" altLang="ko-KR" sz="1100" dirty="0"/>
+            </a:br>
+            <a:r>
+              <a:rPr lang="en-US" altLang="ko-KR" sz="1100" dirty="0">
+                <a:solidFill>
+                  <a:srgbClr val="0000CD"/>
+                </a:solidFill>
+                <a:latin typeface="Consolas" panose="020B0609020204030204" pitchFamily="49" charset="0"/>
+              </a:rPr>
+              <a:t>&lt;</a:t>
+            </a:r>
+            <a:r>
+              <a:rPr lang="en-US" altLang="ko-KR" sz="1100" dirty="0">
+                <a:solidFill>
+                  <a:srgbClr val="A52A2A"/>
+                </a:solidFill>
+                <a:latin typeface="Consolas" panose="020B0609020204030204" pitchFamily="49" charset="0"/>
+              </a:rPr>
+              <a:t>/div</a:t>
+            </a:r>
+            <a:r>
+              <a:rPr lang="en-US" altLang="ko-KR" sz="1100" dirty="0">
+                <a:solidFill>
+                  <a:srgbClr val="0000CD"/>
+                </a:solidFill>
+                <a:latin typeface="Consolas" panose="020B0609020204030204" pitchFamily="49" charset="0"/>
+              </a:rPr>
+              <a:t>&gt;</a:t>
+            </a:r>
+            <a:endParaRPr lang="ko-KR" altLang="en-US" sz="1100" dirty="0"/>
+          </a:p>
+        </p:txBody>
+      </p:sp>
+      <p:sp>
+        <p:nvSpPr>
+          <p:cNvPr id="24" name="직사각형 23"/>
+          <p:cNvSpPr/>
+          <p:nvPr/>
+        </p:nvSpPr>
+        <p:spPr>
+          <a:xfrm>
+            <a:off x="224444" y="662074"/>
             <a:ext cx="11712632" cy="329184"/>
           </a:xfrm>
           <a:prstGeom prst="rect">
@@ -7615,15 +7950,7 @@
             <a:pPr algn="ctr"/>
             <a:r>
               <a:rPr lang="ko-KR" altLang="en-US" dirty="0" smtClean="0"/>
-              <a:t>그리드 </a:t>
-            </a:r>
-            <a:r>
-              <a:rPr lang="en-US" altLang="ko-KR" dirty="0" smtClean="0"/>
-              <a:t>– </a:t>
-            </a:r>
-            <a:r>
-              <a:rPr lang="ko-KR" altLang="en-US" dirty="0" smtClean="0"/>
-              <a:t>동일한 열</a:t>
+              <a:t>그리드 기본 구조</a:t>
             </a:r>
             <a:endParaRPr lang="ko-KR" altLang="en-US" dirty="0"/>
           </a:p>
@@ -7631,13 +7958,65 @@
       </p:sp>
       <p:sp>
         <p:nvSpPr>
-          <p:cNvPr id="7" name="직사각형 6"/>
+          <p:cNvPr id="19" name="직사각형 18"/>
           <p:cNvSpPr/>
           <p:nvPr/>
         </p:nvSpPr>
         <p:spPr>
           <a:xfrm>
-            <a:off x="239684" y="1058716"/>
+            <a:off x="224444" y="1906112"/>
+            <a:ext cx="11712632" cy="329184"/>
+          </a:xfrm>
+          <a:prstGeom prst="rect">
+            <a:avLst/>
+          </a:prstGeom>
+        </p:spPr>
+        <p:style>
+          <a:lnRef idx="2">
+            <a:schemeClr val="accent1">
+              <a:shade val="50000"/>
+            </a:schemeClr>
+          </a:lnRef>
+          <a:fillRef idx="1">
+            <a:schemeClr val="accent1"/>
+          </a:fillRef>
+          <a:effectRef idx="0">
+            <a:schemeClr val="accent1"/>
+          </a:effectRef>
+          <a:fontRef idx="minor">
+            <a:schemeClr val="lt1"/>
+          </a:fontRef>
+        </p:style>
+        <p:txBody>
+          <a:bodyPr rtlCol="0" anchor="ctr"/>
+          <a:lstStyle/>
+          <a:p>
+            <a:pPr algn="ctr"/>
+            <a:r>
+              <a:rPr lang="ko-KR" altLang="en-US" dirty="0" smtClean="0"/>
+              <a:t>그리드 </a:t>
+            </a:r>
+            <a:r>
+              <a:rPr lang="en-US" altLang="ko-KR" dirty="0" smtClean="0"/>
+              <a:t>– </a:t>
+            </a:r>
+            <a:r>
+              <a:rPr lang="ko-KR" altLang="en-US" dirty="0" smtClean="0"/>
+              <a:t>동일한 열</a:t>
+            </a:r>
+            <a:endParaRPr lang="ko-KR" altLang="en-US" dirty="0"/>
+          </a:p>
+        </p:txBody>
+      </p:sp>
+      <p:sp>
+        <p:nvSpPr>
+          <p:cNvPr id="25" name="직사각형 24"/>
+          <p:cNvSpPr/>
+          <p:nvPr/>
+        </p:nvSpPr>
+        <p:spPr>
+          <a:xfrm>
+            <a:off x="239684" y="2297316"/>
             <a:ext cx="6096000" cy="938719"/>
           </a:xfrm>
           <a:prstGeom prst="rect">
@@ -8084,13 +8463,13 @@
       </p:sp>
       <p:sp>
         <p:nvSpPr>
-          <p:cNvPr id="10" name="직사각형 9"/>
+          <p:cNvPr id="26" name="직사각형 25"/>
           <p:cNvSpPr/>
           <p:nvPr/>
         </p:nvSpPr>
         <p:spPr>
           <a:xfrm>
-            <a:off x="239684" y="2625371"/>
+            <a:off x="239684" y="3863971"/>
             <a:ext cx="6096000" cy="1107996"/>
           </a:xfrm>
           <a:prstGeom prst="rect">
@@ -8625,13 +9004,13 @@
       </p:sp>
       <p:sp>
         <p:nvSpPr>
-          <p:cNvPr id="12" name="직사각형 11"/>
+          <p:cNvPr id="27" name="직사각형 26"/>
           <p:cNvSpPr/>
           <p:nvPr/>
         </p:nvSpPr>
         <p:spPr>
           <a:xfrm>
-            <a:off x="239684" y="4318548"/>
+            <a:off x="239684" y="5557148"/>
             <a:ext cx="3393400" cy="769441"/>
           </a:xfrm>
           <a:prstGeom prst="rect">
@@ -8988,356 +9367,9 @@
           </a:p>
         </p:txBody>
       </p:sp>
-      <p:sp>
-        <p:nvSpPr>
-          <p:cNvPr id="14" name="직사각형 13"/>
-          <p:cNvSpPr/>
-          <p:nvPr/>
-        </p:nvSpPr>
-        <p:spPr>
-          <a:xfrm>
-            <a:off x="239684" y="5779112"/>
-            <a:ext cx="3551582" cy="769441"/>
-          </a:xfrm>
-          <a:prstGeom prst="rect">
-            <a:avLst/>
-          </a:prstGeom>
-        </p:spPr>
-        <p:txBody>
-          <a:bodyPr wrap="square">
-            <a:spAutoFit/>
-          </a:bodyPr>
-          <a:lstStyle>
-            <a:defPPr>
-              <a:defRPr lang="ko-KR"/>
-            </a:defPPr>
-            <a:lvl1pPr marL="0" algn="l" defTabSz="914400" rtl="0" eaLnBrk="1" latinLnBrk="1" hangingPunct="1">
-              <a:defRPr sz="1800" kern="1200">
-                <a:solidFill>
-                  <a:schemeClr val="tx1"/>
-                </a:solidFill>
-                <a:latin typeface="+mn-lt"/>
-                <a:ea typeface="+mn-ea"/>
-                <a:cs typeface="+mn-cs"/>
-              </a:defRPr>
-            </a:lvl1pPr>
-            <a:lvl2pPr marL="457200" algn="l" defTabSz="914400" rtl="0" eaLnBrk="1" latinLnBrk="1" hangingPunct="1">
-              <a:defRPr sz="1800" kern="1200">
-                <a:solidFill>
-                  <a:schemeClr val="tx1"/>
-                </a:solidFill>
-                <a:latin typeface="+mn-lt"/>
-                <a:ea typeface="+mn-ea"/>
-                <a:cs typeface="+mn-cs"/>
-              </a:defRPr>
-            </a:lvl2pPr>
-            <a:lvl3pPr marL="914400" algn="l" defTabSz="914400" rtl="0" eaLnBrk="1" latinLnBrk="1" hangingPunct="1">
-              <a:defRPr sz="1800" kern="1200">
-                <a:solidFill>
-                  <a:schemeClr val="tx1"/>
-                </a:solidFill>
-                <a:latin typeface="+mn-lt"/>
-                <a:ea typeface="+mn-ea"/>
-                <a:cs typeface="+mn-cs"/>
-              </a:defRPr>
-            </a:lvl3pPr>
-            <a:lvl4pPr marL="1371600" algn="l" defTabSz="914400" rtl="0" eaLnBrk="1" latinLnBrk="1" hangingPunct="1">
-              <a:defRPr sz="1800" kern="1200">
-                <a:solidFill>
-                  <a:schemeClr val="tx1"/>
-                </a:solidFill>
-                <a:latin typeface="+mn-lt"/>
-                <a:ea typeface="+mn-ea"/>
-                <a:cs typeface="+mn-cs"/>
-              </a:defRPr>
-            </a:lvl4pPr>
-            <a:lvl5pPr marL="1828800" algn="l" defTabSz="914400" rtl="0" eaLnBrk="1" latinLnBrk="1" hangingPunct="1">
-              <a:defRPr sz="1800" kern="1200">
-                <a:solidFill>
-                  <a:schemeClr val="tx1"/>
-                </a:solidFill>
-                <a:latin typeface="+mn-lt"/>
-                <a:ea typeface="+mn-ea"/>
-                <a:cs typeface="+mn-cs"/>
-              </a:defRPr>
-            </a:lvl5pPr>
-            <a:lvl6pPr marL="2286000" algn="l" defTabSz="914400" rtl="0" eaLnBrk="1" latinLnBrk="1" hangingPunct="1">
-              <a:defRPr sz="1800" kern="1200">
-                <a:solidFill>
-                  <a:schemeClr val="tx1"/>
-                </a:solidFill>
-                <a:latin typeface="+mn-lt"/>
-                <a:ea typeface="+mn-ea"/>
-                <a:cs typeface="+mn-cs"/>
-              </a:defRPr>
-            </a:lvl6pPr>
-            <a:lvl7pPr marL="2743200" algn="l" defTabSz="914400" rtl="0" eaLnBrk="1" latinLnBrk="1" hangingPunct="1">
-              <a:defRPr sz="1800" kern="1200">
-                <a:solidFill>
-                  <a:schemeClr val="tx1"/>
-                </a:solidFill>
-                <a:latin typeface="+mn-lt"/>
-                <a:ea typeface="+mn-ea"/>
-                <a:cs typeface="+mn-cs"/>
-              </a:defRPr>
-            </a:lvl7pPr>
-            <a:lvl8pPr marL="3200400" algn="l" defTabSz="914400" rtl="0" eaLnBrk="1" latinLnBrk="1" hangingPunct="1">
-              <a:defRPr sz="1800" kern="1200">
-                <a:solidFill>
-                  <a:schemeClr val="tx1"/>
-                </a:solidFill>
-                <a:latin typeface="+mn-lt"/>
-                <a:ea typeface="+mn-ea"/>
-                <a:cs typeface="+mn-cs"/>
-              </a:defRPr>
-            </a:lvl8pPr>
-            <a:lvl9pPr marL="3657600" algn="l" defTabSz="914400" rtl="0" eaLnBrk="1" latinLnBrk="1" hangingPunct="1">
-              <a:defRPr sz="1800" kern="1200">
-                <a:solidFill>
-                  <a:schemeClr val="tx1"/>
-                </a:solidFill>
-                <a:latin typeface="+mn-lt"/>
-                <a:ea typeface="+mn-ea"/>
-                <a:cs typeface="+mn-cs"/>
-              </a:defRPr>
-            </a:lvl9pPr>
-          </a:lstStyle>
-          <a:p>
-            <a:r>
-              <a:rPr lang="en-US" altLang="ko-KR" sz="1100" dirty="0">
-                <a:solidFill>
-                  <a:srgbClr val="0000CD"/>
-                </a:solidFill>
-                <a:latin typeface="Consolas" panose="020B0609020204030204" pitchFamily="49" charset="0"/>
-              </a:rPr>
-              <a:t>&lt;</a:t>
-            </a:r>
-            <a:r>
-              <a:rPr lang="en-US" altLang="ko-KR" sz="1100" dirty="0">
-                <a:solidFill>
-                  <a:srgbClr val="A52A2A"/>
-                </a:solidFill>
-                <a:latin typeface="Consolas" panose="020B0609020204030204" pitchFamily="49" charset="0"/>
-              </a:rPr>
-              <a:t>div</a:t>
-            </a:r>
-            <a:r>
-              <a:rPr lang="en-US" altLang="ko-KR" sz="1100" dirty="0">
-                <a:solidFill>
-                  <a:srgbClr val="FF0000"/>
-                </a:solidFill>
-                <a:latin typeface="Consolas" panose="020B0609020204030204" pitchFamily="49" charset="0"/>
-              </a:rPr>
-              <a:t> class</a:t>
-            </a:r>
-            <a:r>
-              <a:rPr lang="en-US" altLang="ko-KR" sz="1100" dirty="0" smtClean="0">
-                <a:solidFill>
-                  <a:srgbClr val="0000CD"/>
-                </a:solidFill>
-                <a:latin typeface="Consolas" panose="020B0609020204030204" pitchFamily="49" charset="0"/>
-              </a:rPr>
-              <a:t>=“row”&gt;</a:t>
-            </a:r>
-            <a:r>
-              <a:rPr lang="en-US" altLang="ko-KR" sz="1100" dirty="0"/>
-              <a:t/>
-            </a:r>
-            <a:br>
-              <a:rPr lang="en-US" altLang="ko-KR" sz="1100" dirty="0"/>
-            </a:br>
-            <a:r>
-              <a:rPr lang="en-US" altLang="ko-KR" sz="1100" dirty="0">
-                <a:solidFill>
-                  <a:srgbClr val="000000"/>
-                </a:solidFill>
-                <a:latin typeface="Consolas" panose="020B0609020204030204" pitchFamily="49" charset="0"/>
-              </a:rPr>
-              <a:t>  </a:t>
-            </a:r>
-            <a:r>
-              <a:rPr lang="en-US" altLang="ko-KR" sz="1100" dirty="0">
-                <a:solidFill>
-                  <a:srgbClr val="0000CD"/>
-                </a:solidFill>
-                <a:latin typeface="Consolas" panose="020B0609020204030204" pitchFamily="49" charset="0"/>
-              </a:rPr>
-              <a:t>&lt;</a:t>
-            </a:r>
-            <a:r>
-              <a:rPr lang="en-US" altLang="ko-KR" sz="1100" dirty="0">
-                <a:solidFill>
-                  <a:srgbClr val="A52A2A"/>
-                </a:solidFill>
-                <a:latin typeface="Consolas" panose="020B0609020204030204" pitchFamily="49" charset="0"/>
-              </a:rPr>
-              <a:t>div</a:t>
-            </a:r>
-            <a:r>
-              <a:rPr lang="en-US" altLang="ko-KR" sz="1100" dirty="0">
-                <a:solidFill>
-                  <a:srgbClr val="FF0000"/>
-                </a:solidFill>
-                <a:latin typeface="Consolas" panose="020B0609020204030204" pitchFamily="49" charset="0"/>
-              </a:rPr>
-              <a:t> class</a:t>
-            </a:r>
-            <a:r>
-              <a:rPr lang="en-US" altLang="ko-KR" sz="1100" dirty="0" smtClean="0">
-                <a:solidFill>
-                  <a:srgbClr val="0000CD"/>
-                </a:solidFill>
-                <a:latin typeface="Consolas" panose="020B0609020204030204" pitchFamily="49" charset="0"/>
-              </a:rPr>
-              <a:t>=“col-*-*”&gt;&lt;</a:t>
-            </a:r>
-            <a:r>
-              <a:rPr lang="en-US" altLang="ko-KR" sz="1100" dirty="0" smtClean="0">
-                <a:solidFill>
-                  <a:srgbClr val="A52A2A"/>
-                </a:solidFill>
-                <a:latin typeface="Consolas" panose="020B0609020204030204" pitchFamily="49" charset="0"/>
-              </a:rPr>
-              <a:t>/</a:t>
-            </a:r>
-            <a:r>
-              <a:rPr lang="en-US" altLang="ko-KR" sz="1100" dirty="0">
-                <a:solidFill>
-                  <a:srgbClr val="A52A2A"/>
-                </a:solidFill>
-                <a:latin typeface="Consolas" panose="020B0609020204030204" pitchFamily="49" charset="0"/>
-              </a:rPr>
-              <a:t>div</a:t>
-            </a:r>
-            <a:r>
-              <a:rPr lang="en-US" altLang="ko-KR" sz="1100" dirty="0">
-                <a:solidFill>
-                  <a:srgbClr val="0000CD"/>
-                </a:solidFill>
-                <a:latin typeface="Consolas" panose="020B0609020204030204" pitchFamily="49" charset="0"/>
-              </a:rPr>
-              <a:t>&gt;</a:t>
-            </a:r>
-            <a:r>
-              <a:rPr lang="en-US" altLang="ko-KR" sz="1100" dirty="0"/>
-              <a:t/>
-            </a:r>
-            <a:br>
-              <a:rPr lang="en-US" altLang="ko-KR" sz="1100" dirty="0"/>
-            </a:br>
-            <a:r>
-              <a:rPr lang="en-US" altLang="ko-KR" sz="1100" dirty="0">
-                <a:solidFill>
-                  <a:srgbClr val="000000"/>
-                </a:solidFill>
-                <a:latin typeface="Consolas" panose="020B0609020204030204" pitchFamily="49" charset="0"/>
-              </a:rPr>
-              <a:t>  </a:t>
-            </a:r>
-            <a:r>
-              <a:rPr lang="en-US" altLang="ko-KR" sz="1100" dirty="0">
-                <a:solidFill>
-                  <a:srgbClr val="0000CD"/>
-                </a:solidFill>
-                <a:latin typeface="Consolas" panose="020B0609020204030204" pitchFamily="49" charset="0"/>
-              </a:rPr>
-              <a:t>&lt;</a:t>
-            </a:r>
-            <a:r>
-              <a:rPr lang="en-US" altLang="ko-KR" sz="1100" dirty="0">
-                <a:solidFill>
-                  <a:srgbClr val="A52A2A"/>
-                </a:solidFill>
-                <a:latin typeface="Consolas" panose="020B0609020204030204" pitchFamily="49" charset="0"/>
-              </a:rPr>
-              <a:t>div</a:t>
-            </a:r>
-            <a:r>
-              <a:rPr lang="en-US" altLang="ko-KR" sz="1100" dirty="0">
-                <a:solidFill>
-                  <a:srgbClr val="FF0000"/>
-                </a:solidFill>
-                <a:latin typeface="Consolas" panose="020B0609020204030204" pitchFamily="49" charset="0"/>
-              </a:rPr>
-              <a:t> class</a:t>
-            </a:r>
-            <a:r>
-              <a:rPr lang="en-US" altLang="ko-KR" sz="1100" dirty="0" smtClean="0">
-                <a:solidFill>
-                  <a:srgbClr val="0000CD"/>
-                </a:solidFill>
-                <a:latin typeface="Consolas" panose="020B0609020204030204" pitchFamily="49" charset="0"/>
-              </a:rPr>
-              <a:t>=“col-</a:t>
-            </a:r>
-            <a:r>
-              <a:rPr lang="en-US" altLang="ko-KR" sz="1100" dirty="0">
-                <a:solidFill>
-                  <a:srgbClr val="0000CD"/>
-                </a:solidFill>
-                <a:latin typeface="Consolas" panose="020B0609020204030204" pitchFamily="49" charset="0"/>
-              </a:rPr>
-              <a:t>*-*"&gt;&lt;</a:t>
-            </a:r>
-            <a:r>
-              <a:rPr lang="en-US" altLang="ko-KR" sz="1100" dirty="0">
-                <a:solidFill>
-                  <a:srgbClr val="A52A2A"/>
-                </a:solidFill>
-                <a:latin typeface="Consolas" panose="020B0609020204030204" pitchFamily="49" charset="0"/>
-              </a:rPr>
-              <a:t>/div</a:t>
-            </a:r>
-            <a:r>
-              <a:rPr lang="en-US" altLang="ko-KR" sz="1100" dirty="0">
-                <a:solidFill>
-                  <a:srgbClr val="0000CD"/>
-                </a:solidFill>
-                <a:latin typeface="Consolas" panose="020B0609020204030204" pitchFamily="49" charset="0"/>
-              </a:rPr>
-              <a:t>&gt;</a:t>
-            </a:r>
-            <a:r>
-              <a:rPr lang="en-US" altLang="ko-KR" sz="1100" dirty="0"/>
-              <a:t/>
-            </a:r>
-            <a:br>
-              <a:rPr lang="en-US" altLang="ko-KR" sz="1100" dirty="0"/>
-            </a:br>
-            <a:r>
-              <a:rPr lang="en-US" altLang="ko-KR" sz="1100" dirty="0">
-                <a:solidFill>
-                  <a:srgbClr val="0000CD"/>
-                </a:solidFill>
-                <a:latin typeface="Consolas" panose="020B0609020204030204" pitchFamily="49" charset="0"/>
-              </a:rPr>
-              <a:t>&lt;</a:t>
-            </a:r>
-            <a:r>
-              <a:rPr lang="en-US" altLang="ko-KR" sz="1100" dirty="0">
-                <a:solidFill>
-                  <a:srgbClr val="A52A2A"/>
-                </a:solidFill>
-                <a:latin typeface="Consolas" panose="020B0609020204030204" pitchFamily="49" charset="0"/>
-              </a:rPr>
-              <a:t>/div</a:t>
-            </a:r>
-            <a:r>
-              <a:rPr lang="en-US" altLang="ko-KR" sz="1100" dirty="0">
-                <a:solidFill>
-                  <a:srgbClr val="0000CD"/>
-                </a:solidFill>
-                <a:latin typeface="Consolas" panose="020B0609020204030204" pitchFamily="49" charset="0"/>
-              </a:rPr>
-              <a:t>&gt;</a:t>
-            </a:r>
-            <a:endParaRPr lang="ko-KR" altLang="en-US" sz="1100" dirty="0"/>
-          </a:p>
-        </p:txBody>
-      </p:sp>
       <p:pic>
         <p:nvPicPr>
-          <p:cNvPr id="15" name="그림 14"/>
+          <p:cNvPr id="28" name="그림 27"/>
           <p:cNvPicPr>
             <a:picLocks noChangeAspect="1"/>
           </p:cNvPicPr>
@@ -9357,7 +9389,7 @@
         </p:blipFill>
         <p:spPr>
           <a:xfrm>
-            <a:off x="4782888" y="1177062"/>
+            <a:off x="4782888" y="2415662"/>
             <a:ext cx="6699153" cy="465919"/>
           </a:xfrm>
           <a:prstGeom prst="rect">
@@ -9367,7 +9399,7 @@
       </p:pic>
       <p:pic>
         <p:nvPicPr>
-          <p:cNvPr id="16" name="그림 15"/>
+          <p:cNvPr id="29" name="그림 28"/>
           <p:cNvPicPr>
             <a:picLocks noChangeAspect="1"/>
           </p:cNvPicPr>
@@ -9387,7 +9419,7 @@
         </p:blipFill>
         <p:spPr>
           <a:xfrm>
-            <a:off x="4776083" y="2532973"/>
+            <a:off x="4776083" y="3771573"/>
             <a:ext cx="6462920" cy="445088"/>
           </a:xfrm>
           <a:prstGeom prst="rect">
@@ -9397,13 +9429,13 @@
       </p:pic>
       <p:sp>
         <p:nvSpPr>
-          <p:cNvPr id="17" name="직사각형 16"/>
+          <p:cNvPr id="30" name="직사각형 29"/>
           <p:cNvSpPr/>
           <p:nvPr/>
         </p:nvSpPr>
         <p:spPr>
           <a:xfrm>
-            <a:off x="4776083" y="3064849"/>
+            <a:off x="4776083" y="4303449"/>
             <a:ext cx="6096000" cy="430887"/>
           </a:xfrm>
           <a:prstGeom prst="rect">
@@ -9651,13 +9683,13 @@
       </p:sp>
       <p:sp>
         <p:nvSpPr>
-          <p:cNvPr id="18" name="직사각형 17"/>
+          <p:cNvPr id="31" name="직사각형 30"/>
           <p:cNvSpPr/>
           <p:nvPr/>
         </p:nvSpPr>
         <p:spPr>
           <a:xfrm>
-            <a:off x="4782888" y="1723836"/>
+            <a:off x="4782888" y="2962436"/>
             <a:ext cx="6692348" cy="261610"/>
           </a:xfrm>
           <a:prstGeom prst="rect">
@@ -9806,13 +9838,13 @@
       </p:sp>
       <p:sp>
         <p:nvSpPr>
-          <p:cNvPr id="20" name="직사각형 19"/>
+          <p:cNvPr id="32" name="직사각형 31"/>
           <p:cNvSpPr/>
           <p:nvPr/>
         </p:nvSpPr>
         <p:spPr>
           <a:xfrm>
-            <a:off x="4782888" y="4732603"/>
+            <a:off x="4782888" y="5971203"/>
             <a:ext cx="6096000" cy="430887"/>
           </a:xfrm>
           <a:prstGeom prst="rect">
@@ -9987,7 +10019,7 @@
       </p:sp>
       <p:pic>
         <p:nvPicPr>
-          <p:cNvPr id="21" name="그림 20"/>
+          <p:cNvPr id="33" name="그림 32"/>
           <p:cNvPicPr>
             <a:picLocks noChangeAspect="1"/>
           </p:cNvPicPr>
@@ -10007,7 +10039,7 @@
         </p:blipFill>
         <p:spPr>
           <a:xfrm>
-            <a:off x="4776083" y="4192741"/>
+            <a:off x="4776083" y="5431341"/>
             <a:ext cx="6871074" cy="483424"/>
           </a:xfrm>
           <a:prstGeom prst="rect">
@@ -10017,13 +10049,13 @@
       </p:pic>
       <p:sp>
         <p:nvSpPr>
-          <p:cNvPr id="22" name="직사각형 21"/>
+          <p:cNvPr id="34" name="직사각형 33"/>
           <p:cNvSpPr/>
           <p:nvPr/>
         </p:nvSpPr>
         <p:spPr>
           <a:xfrm>
-            <a:off x="224444" y="2072221"/>
+            <a:off x="224444" y="3310821"/>
             <a:ext cx="11712632" cy="329184"/>
           </a:xfrm>
           <a:prstGeom prst="rect">
@@ -10065,13 +10097,13 @@
       </p:sp>
       <p:sp>
         <p:nvSpPr>
-          <p:cNvPr id="23" name="직사각형 22"/>
+          <p:cNvPr id="35" name="직사각형 34"/>
           <p:cNvSpPr/>
           <p:nvPr/>
         </p:nvSpPr>
         <p:spPr>
           <a:xfrm>
-            <a:off x="224444" y="3768970"/>
+            <a:off x="224444" y="5007570"/>
             <a:ext cx="11712632" cy="329184"/>
           </a:xfrm>
           <a:prstGeom prst="rect">
@@ -10102,50 +10134,6 @@
             <a:r>
               <a:rPr lang="ko-KR" altLang="en-US" dirty="0" smtClean="0"/>
               <a:t>두개의 유기적인 열</a:t>
-            </a:r>
-            <a:endParaRPr lang="ko-KR" altLang="en-US" dirty="0"/>
-          </a:p>
-        </p:txBody>
-      </p:sp>
-      <p:sp>
-        <p:nvSpPr>
-          <p:cNvPr id="24" name="직사각형 23"/>
-          <p:cNvSpPr/>
-          <p:nvPr/>
-        </p:nvSpPr>
-        <p:spPr>
-          <a:xfrm>
-            <a:off x="224444" y="5367288"/>
-            <a:ext cx="11712632" cy="329184"/>
-          </a:xfrm>
-          <a:prstGeom prst="rect">
-            <a:avLst/>
-          </a:prstGeom>
-        </p:spPr>
-        <p:style>
-          <a:lnRef idx="2">
-            <a:schemeClr val="accent1">
-              <a:shade val="50000"/>
-            </a:schemeClr>
-          </a:lnRef>
-          <a:fillRef idx="1">
-            <a:schemeClr val="accent1"/>
-          </a:fillRef>
-          <a:effectRef idx="0">
-            <a:schemeClr val="accent1"/>
-          </a:effectRef>
-          <a:fontRef idx="minor">
-            <a:schemeClr val="lt1"/>
-          </a:fontRef>
-        </p:style>
-        <p:txBody>
-          <a:bodyPr rtlCol="0" anchor="ctr"/>
-          <a:lstStyle/>
-          <a:p>
-            <a:pPr algn="ctr"/>
-            <a:r>
-              <a:rPr lang="ko-KR" altLang="en-US" dirty="0" smtClean="0"/>
-              <a:t>그리드 기본 구조</a:t>
             </a:r>
             <a:endParaRPr lang="ko-KR" altLang="en-US" dirty="0"/>
           </a:p>
@@ -10233,11 +10221,7 @@
           <a:p>
             <a:r>
               <a:rPr lang="en-US" altLang="ko-KR" sz="1600" dirty="0" smtClean="0"/>
-              <a:t>Basic </a:t>
-            </a:r>
-            <a:r>
-              <a:rPr lang="en-US" altLang="ko-KR" sz="1600" dirty="0" smtClean="0"/>
-              <a:t>component – forms</a:t>
+              <a:t>Basic component – forms</a:t>
             </a:r>
           </a:p>
         </p:txBody>
@@ -10411,13 +10395,7 @@
               <a:rPr lang="ko-KR" altLang="en-US" sz="1100" dirty="0" smtClean="0">
                 <a:latin typeface="Consolas" panose="020B0609020204030204" pitchFamily="49" charset="0"/>
               </a:rPr>
-              <a:t>요소의 </a:t>
-            </a:r>
-            <a:r>
-              <a:rPr lang="ko-KR" altLang="en-US" sz="1100" dirty="0" smtClean="0">
-                <a:latin typeface="Consolas" panose="020B0609020204030204" pitchFamily="49" charset="0"/>
-              </a:rPr>
-              <a:t>모양을 만들어 주는 </a:t>
+              <a:t>요소의 모양을 만들어 주는 </a:t>
             </a:r>
             <a:r>
               <a:rPr lang="en-US" altLang="ko-KR" sz="1100" dirty="0" err="1" smtClean="0">
@@ -10437,13 +10415,7 @@
               <a:rPr lang="en-US" altLang="ko-KR" sz="1100" dirty="0" smtClean="0">
                 <a:latin typeface="Consolas" panose="020B0609020204030204" pitchFamily="49" charset="0"/>
               </a:rPr>
-              <a:t>width</a:t>
-            </a:r>
-            <a:r>
-              <a:rPr lang="en-US" altLang="ko-KR" sz="1100" dirty="0" smtClean="0">
-                <a:latin typeface="Consolas" panose="020B0609020204030204" pitchFamily="49" charset="0"/>
-              </a:rPr>
-              <a:t>: 100%</a:t>
+              <a:t>width: 100%</a:t>
             </a:r>
           </a:p>
           <a:p>
@@ -10553,7 +10525,7 @@
           <a:graphicData uri="http://schemas.openxmlformats.org/presentationml/2006/ole">
             <mc:AlternateContent xmlns:mc="http://schemas.openxmlformats.org/markup-compatibility/2006">
               <mc:Choice xmlns:v="urn:schemas-microsoft-com:vml" Requires="v">
-                <p:oleObj spid="_x0000_s12292" name="Image" r:id="rId3" imgW="10641240" imgH="964800" progId="Photoshop.Image.18">
+                <p:oleObj spid="_x0000_s12294" name="Image" r:id="rId3" imgW="10641240" imgH="964800" progId="Photoshop.Image.18">
                   <p:embed/>
                 </p:oleObj>
               </mc:Choice>
@@ -10670,11 +10642,7 @@
           <a:p>
             <a:r>
               <a:rPr lang="en-US" altLang="ko-KR" sz="1600" dirty="0" smtClean="0"/>
-              <a:t>Basic </a:t>
-            </a:r>
-            <a:r>
-              <a:rPr lang="en-US" altLang="ko-KR" sz="1600" dirty="0" smtClean="0"/>
-              <a:t>component – forms</a:t>
+              <a:t>Basic component – forms</a:t>
             </a:r>
           </a:p>
         </p:txBody>
@@ -11920,7 +11888,7 @@
           <a:graphicData uri="http://schemas.openxmlformats.org/presentationml/2006/ole">
             <mc:AlternateContent xmlns:mc="http://schemas.openxmlformats.org/markup-compatibility/2006">
               <mc:Choice xmlns:v="urn:schemas-microsoft-com:vml" Requires="v">
-                <p:oleObj spid="_x0000_s11268" name="Image" r:id="rId3" imgW="11314080" imgH="3288600" progId="Photoshop.Image.18">
+                <p:oleObj spid="_x0000_s11270" name="Image" r:id="rId3" imgW="11314080" imgH="3288600" progId="Photoshop.Image.18">
                   <p:embed/>
                 </p:oleObj>
               </mc:Choice>
@@ -12037,11 +12005,7 @@
           <a:p>
             <a:r>
               <a:rPr lang="en-US" altLang="ko-KR" sz="1600" dirty="0" smtClean="0"/>
-              <a:t>Basic </a:t>
-            </a:r>
-            <a:r>
-              <a:rPr lang="en-US" altLang="ko-KR" sz="1600" dirty="0" smtClean="0"/>
-              <a:t>component – forms</a:t>
+              <a:t>Basic component – forms</a:t>
             </a:r>
           </a:p>
         </p:txBody>
@@ -12399,15 +12363,7 @@
             <a:pPr algn="ctr"/>
             <a:r>
               <a:rPr lang="en-US" altLang="ko-KR" dirty="0" smtClean="0"/>
-              <a:t>.</a:t>
-            </a:r>
-            <a:r>
-              <a:rPr lang="en-US" altLang="ko-KR" dirty="0" smtClean="0"/>
-              <a:t>input</a:t>
-            </a:r>
-            <a:r>
-              <a:rPr lang="en-US" altLang="ko-KR" dirty="0" smtClean="0"/>
-              <a:t>-group</a:t>
+              <a:t>.input-group</a:t>
             </a:r>
             <a:endParaRPr lang="ko-KR" altLang="en-US" dirty="0"/>
           </a:p>
@@ -12435,7 +12391,7 @@
           <a:graphicData uri="http://schemas.openxmlformats.org/presentationml/2006/ole">
             <mc:AlternateContent xmlns:mc="http://schemas.openxmlformats.org/markup-compatibility/2006">
               <mc:Choice xmlns:v="urn:schemas-microsoft-com:vml" Requires="v">
-                <p:oleObj spid="_x0000_s13317" name="Image" r:id="rId3" imgW="10310760" imgH="583920" progId="Photoshop.Image.18">
+                <p:oleObj spid="_x0000_s13319" name="Image" r:id="rId3" imgW="10310760" imgH="583920" progId="Photoshop.Image.18">
                   <p:embed/>
                 </p:oleObj>
               </mc:Choice>
@@ -13293,11 +13249,7 @@
           <a:p>
             <a:r>
               <a:rPr lang="en-US" altLang="ko-KR" sz="1600" dirty="0" smtClean="0"/>
-              <a:t>Basic </a:t>
-            </a:r>
-            <a:r>
-              <a:rPr lang="en-US" altLang="ko-KR" sz="1600" dirty="0" smtClean="0"/>
-              <a:t>component – tooltip</a:t>
+              <a:t>Basic component – tooltip</a:t>
             </a:r>
           </a:p>
         </p:txBody>
@@ -14354,7 +14306,7 @@
           <a:graphicData uri="http://schemas.openxmlformats.org/presentationml/2006/ole">
             <mc:AlternateContent xmlns:mc="http://schemas.openxmlformats.org/markup-compatibility/2006">
               <mc:Choice xmlns:v="urn:schemas-microsoft-com:vml" Requires="v">
-                <p:oleObj spid="_x0000_s14345" name="Image" r:id="rId3" imgW="1802880" imgH="571320" progId="Photoshop.Image.18">
+                <p:oleObj spid="_x0000_s14351" name="Image" r:id="rId3" imgW="1802880" imgH="571320" progId="Photoshop.Image.18">
                   <p:embed/>
                 </p:oleObj>
               </mc:Choice>
@@ -14411,7 +14363,7 @@
           <a:graphicData uri="http://schemas.openxmlformats.org/presentationml/2006/ole">
             <mc:AlternateContent xmlns:mc="http://schemas.openxmlformats.org/markup-compatibility/2006">
               <mc:Choice xmlns:v="urn:schemas-microsoft-com:vml" Requires="v">
-                <p:oleObj spid="_x0000_s14346" name="Image" r:id="rId5" imgW="2526840" imgH="1002960" progId="Photoshop.Image.18">
+                <p:oleObj spid="_x0000_s14352" name="Image" r:id="rId5" imgW="2526840" imgH="1002960" progId="Photoshop.Image.18">
                   <p:embed/>
                 </p:oleObj>
               </mc:Choice>
@@ -14468,7 +14420,7 @@
           <a:graphicData uri="http://schemas.openxmlformats.org/presentationml/2006/ole">
             <mc:AlternateContent xmlns:mc="http://schemas.openxmlformats.org/markup-compatibility/2006">
               <mc:Choice xmlns:v="urn:schemas-microsoft-com:vml" Requires="v">
-                <p:oleObj spid="_x0000_s14347" name="Image" r:id="rId7" imgW="2603160" imgH="1282320" progId="Photoshop.Image.18">
+                <p:oleObj spid="_x0000_s14353" name="Image" r:id="rId7" imgW="2603160" imgH="1282320" progId="Photoshop.Image.18">
                   <p:embed/>
                 </p:oleObj>
               </mc:Choice>
@@ -15125,7 +15077,7 @@
           <a:graphicData uri="http://schemas.openxmlformats.org/presentationml/2006/ole">
             <mc:AlternateContent xmlns:mc="http://schemas.openxmlformats.org/markup-compatibility/2006">
               <mc:Choice xmlns:v="urn:schemas-microsoft-com:vml" Requires="v">
-                <p:oleObj spid="_x0000_s9222" name="Image" r:id="rId3" imgW="10209240" imgH="622080" progId="Photoshop.Image.18">
+                <p:oleObj spid="_x0000_s9224" name="Image" r:id="rId3" imgW="10209240" imgH="622080" progId="Photoshop.Image.18">
                   <p:embed/>
                 </p:oleObj>
               </mc:Choice>
@@ -15552,7 +15504,7 @@
           <a:graphicData uri="http://schemas.openxmlformats.org/presentationml/2006/ole">
             <mc:AlternateContent xmlns:mc="http://schemas.openxmlformats.org/markup-compatibility/2006">
               <mc:Choice xmlns:v="urn:schemas-microsoft-com:vml" Requires="v">
-                <p:oleObj spid="_x0000_s7201" name="Image" r:id="rId3" imgW="8457120" imgH="622080" progId="Photoshop.Image.18">
+                <p:oleObj spid="_x0000_s7205" name="Image" r:id="rId3" imgW="8457120" imgH="622080" progId="Photoshop.Image.18">
                   <p:embed/>
                 </p:oleObj>
               </mc:Choice>
@@ -15878,7 +15830,7 @@
           <a:graphicData uri="http://schemas.openxmlformats.org/presentationml/2006/ole">
             <mc:AlternateContent xmlns:mc="http://schemas.openxmlformats.org/markup-compatibility/2006">
               <mc:Choice xmlns:v="urn:schemas-microsoft-com:vml" Requires="v">
-                <p:oleObj spid="_x0000_s7202" name="Image" r:id="rId5" imgW="3110760" imgH="622080" progId="Photoshop.Image.18">
+                <p:oleObj spid="_x0000_s7206" name="Image" r:id="rId5" imgW="3110760" imgH="622080" progId="Photoshop.Image.18">
                   <p:embed/>
                 </p:oleObj>
               </mc:Choice>
@@ -17756,11 +17708,7 @@
             </a:r>
             <a:r>
               <a:rPr lang="ko-KR" altLang="en-US" sz="1200" dirty="0" smtClean="0"/>
-              <a:t>추후 변경 </a:t>
-            </a:r>
-            <a:r>
-              <a:rPr lang="ko-KR" altLang="en-US" sz="1200" dirty="0" smtClean="0"/>
-              <a:t>가능 샘플용 클래스</a:t>
+              <a:t>추후 변경 가능 샘플용 클래스</a:t>
             </a:r>
             <a:r>
               <a:rPr lang="en-US" altLang="ko-KR" sz="1200" dirty="0" smtClean="0"/>
@@ -17979,7 +17927,7 @@
           <a:graphicData uri="http://schemas.openxmlformats.org/presentationml/2006/ole">
             <mc:AlternateContent xmlns:mc="http://schemas.openxmlformats.org/markup-compatibility/2006">
               <mc:Choice xmlns:v="urn:schemas-microsoft-com:vml" Requires="v">
-                <p:oleObj spid="_x0000_s2088" name="Image" r:id="rId3" imgW="10209240" imgH="622080" progId="Photoshop.Image.18">
+                <p:oleObj spid="_x0000_s2092" name="Image" r:id="rId3" imgW="10209240" imgH="622080" progId="Photoshop.Image.18">
                   <p:embed/>
                 </p:oleObj>
               </mc:Choice>
@@ -18036,7 +17984,7 @@
           <a:graphicData uri="http://schemas.openxmlformats.org/presentationml/2006/ole">
             <mc:AlternateContent xmlns:mc="http://schemas.openxmlformats.org/markup-compatibility/2006">
               <mc:Choice xmlns:v="urn:schemas-microsoft-com:vml" Requires="v">
-                <p:oleObj spid="_x0000_s2089" name="Image" r:id="rId5" imgW="2044440" imgH="533160" progId="Photoshop.Image.18">
+                <p:oleObj spid="_x0000_s2093" name="Image" r:id="rId5" imgW="2044440" imgH="533160" progId="Photoshop.Image.18">
                   <p:embed/>
                 </p:oleObj>
               </mc:Choice>
@@ -18444,7 +18392,7 @@
           <a:graphicData uri="http://schemas.openxmlformats.org/presentationml/2006/ole">
             <mc:AlternateContent xmlns:mc="http://schemas.openxmlformats.org/markup-compatibility/2006">
               <mc:Choice xmlns:v="urn:schemas-microsoft-com:vml" Requires="v">
-                <p:oleObj spid="_x0000_s8204" name="Image" r:id="rId3" imgW="7860240" imgH="1828440" progId="Photoshop.Image.18">
+                <p:oleObj spid="_x0000_s8206" name="Image" r:id="rId3" imgW="7860240" imgH="1828440" progId="Photoshop.Image.18">
                   <p:embed/>
                 </p:oleObj>
               </mc:Choice>
@@ -18874,7 +18822,7 @@
           <a:graphicData uri="http://schemas.openxmlformats.org/presentationml/2006/ole">
             <mc:AlternateContent xmlns:mc="http://schemas.openxmlformats.org/markup-compatibility/2006">
               <mc:Choice xmlns:v="urn:schemas-microsoft-com:vml" Requires="v">
-                <p:oleObj spid="_x0000_s3104" name="Image" r:id="rId3" imgW="3428280" imgH="1764720" progId="Photoshop.Image.18">
+                <p:oleObj spid="_x0000_s3106" name="Image" r:id="rId3" imgW="3428280" imgH="1764720" progId="Photoshop.Image.18">
                   <p:embed/>
                 </p:oleObj>
               </mc:Choice>
@@ -19965,7 +19913,7 @@
           <a:graphicData uri="http://schemas.openxmlformats.org/presentationml/2006/ole">
             <mc:AlternateContent xmlns:mc="http://schemas.openxmlformats.org/markup-compatibility/2006">
               <mc:Choice xmlns:v="urn:schemas-microsoft-com:vml" Requires="v">
-                <p:oleObj spid="_x0000_s5151" name="Image" r:id="rId3" imgW="3682440" imgH="1764720" progId="Photoshop.Image.18">
+                <p:oleObj spid="_x0000_s5153" name="Image" r:id="rId3" imgW="3682440" imgH="1764720" progId="Photoshop.Image.18">
                   <p:embed/>
                 </p:oleObj>
               </mc:Choice>
@@ -20615,7 +20563,7 @@
           <a:graphicData uri="http://schemas.openxmlformats.org/presentationml/2006/ole">
             <mc:AlternateContent xmlns:mc="http://schemas.openxmlformats.org/markup-compatibility/2006">
               <mc:Choice xmlns:v="urn:schemas-microsoft-com:vml" Requires="v">
-                <p:oleObj spid="_x0000_s1078" name="Image" r:id="rId3" imgW="17879040" imgH="977760" progId="Photoshop.Image.18">
+                <p:oleObj spid="_x0000_s1080" name="Image" r:id="rId3" imgW="17879040" imgH="977760" progId="Photoshop.Image.18">
                   <p:embed/>
                 </p:oleObj>
               </mc:Choice>

</xml_diff>